<commit_message>
docs: fix some typos and other thing in the presentation
</commit_message>
<xml_diff>
--- a/project_design/Project_presentation_v1.pptx
+++ b/project_design/Project_presentation_v1.pptx
@@ -115,6 +115,11 @@
       </a:defRPr>
     </a:lvl9pPr>
   </p:defaultTextStyle>
+  <p:extLst>
+    <p:ext uri="{EFAFB233-063F-42B5-8137-9DF3F51BA10A}">
+      <p15:sldGuideLst xmlns:p15="http://schemas.microsoft.com/office/powerpoint/2012/main"/>
+    </p:ext>
+  </p:extLst>
 </p:presentation>
 </file>
 
@@ -200,7 +205,7 @@
           <a:p>
             <a:fld id="{D9360710-82AB-E741-94A5-3EBA87CE8918}" type="datetimeFigureOut">
               <a:rPr lang="en-FI" smtClean="0"/>
-              <a:t>30.10.2024</a:t>
+              <a:t>31.10.2024</a:t>
             </a:fld>
             <a:endParaRPr lang="en-FI"/>
           </a:p>
@@ -701,6 +706,90 @@
           <a:p>
             <a:fld id="{F6281E9E-A6C3-CB4D-B39D-A3ACFB7CE59E}" type="slidenum">
               <a:rPr lang="en-FI" smtClean="0"/>
+              <a:t>6</a:t>
+            </a:fld>
+            <a:endParaRPr lang="en-FI"/>
+          </a:p>
+        </p:txBody>
+      </p:sp>
+    </p:spTree>
+    <p:extLst>
+      <p:ext uri="{BB962C8B-B14F-4D97-AF65-F5344CB8AC3E}">
+        <p14:creationId xmlns:p14="http://schemas.microsoft.com/office/powerpoint/2010/main" val="3385691221"/>
+      </p:ext>
+    </p:extLst>
+  </p:cSld>
+  <p:clrMapOvr>
+    <a:masterClrMapping/>
+  </p:clrMapOvr>
+</p:notes>
+</file>
+
+<file path=ppt/notesSlides/notesSlide4.xml><?xml version="1.0" encoding="utf-8"?>
+<p:notes xmlns:a="http://schemas.openxmlformats.org/drawingml/2006/main" xmlns:r="http://schemas.openxmlformats.org/officeDocument/2006/relationships" xmlns:p="http://schemas.openxmlformats.org/presentationml/2006/main">
+  <p:cSld>
+    <p:spTree>
+      <p:nvGrpSpPr>
+        <p:cNvPr id="1" name=""/>
+        <p:cNvGrpSpPr/>
+        <p:nvPr/>
+      </p:nvGrpSpPr>
+      <p:grpSpPr>
+        <a:xfrm>
+          <a:off x="0" y="0"/>
+          <a:ext cx="0" cy="0"/>
+          <a:chOff x="0" y="0"/>
+          <a:chExt cx="0" cy="0"/>
+        </a:xfrm>
+      </p:grpSpPr>
+      <p:sp>
+        <p:nvSpPr>
+          <p:cNvPr id="2" name="Slide Image Placeholder 1"/>
+          <p:cNvSpPr>
+            <a:spLocks noGrp="1" noRot="1" noChangeAspect="1"/>
+          </p:cNvSpPr>
+          <p:nvPr>
+            <p:ph type="sldImg"/>
+          </p:nvPr>
+        </p:nvSpPr>
+        <p:spPr/>
+      </p:sp>
+      <p:sp>
+        <p:nvSpPr>
+          <p:cNvPr id="3" name="Notes Placeholder 2"/>
+          <p:cNvSpPr>
+            <a:spLocks noGrp="1"/>
+          </p:cNvSpPr>
+          <p:nvPr>
+            <p:ph type="body" idx="1"/>
+          </p:nvPr>
+        </p:nvSpPr>
+        <p:spPr/>
+        <p:txBody>
+          <a:bodyPr/>
+          <a:lstStyle/>
+          <a:p>
+            <a:endParaRPr lang="en-FI" dirty="0"/>
+          </a:p>
+        </p:txBody>
+      </p:sp>
+      <p:sp>
+        <p:nvSpPr>
+          <p:cNvPr id="4" name="Slide Number Placeholder 3"/>
+          <p:cNvSpPr>
+            <a:spLocks noGrp="1"/>
+          </p:cNvSpPr>
+          <p:nvPr>
+            <p:ph type="sldNum" sz="quarter" idx="5"/>
+          </p:nvPr>
+        </p:nvSpPr>
+        <p:spPr/>
+        <p:txBody>
+          <a:bodyPr/>
+          <a:lstStyle/>
+          <a:p>
+            <a:fld id="{F6281E9E-A6C3-CB4D-B39D-A3ACFB7CE59E}" type="slidenum">
+              <a:rPr lang="en-FI" smtClean="0"/>
               <a:t>7</a:t>
             </a:fld>
             <a:endParaRPr lang="en-FI"/>
@@ -720,7 +809,7 @@
 </p:notes>
 </file>
 
-<file path=ppt/notesSlides/notesSlide4.xml><?xml version="1.0" encoding="utf-8"?>
+<file path=ppt/notesSlides/notesSlide5.xml><?xml version="1.0" encoding="utf-8"?>
 <p:notes xmlns:a="http://schemas.openxmlformats.org/drawingml/2006/main" xmlns:r="http://schemas.openxmlformats.org/officeDocument/2006/relationships" xmlns:p="http://schemas.openxmlformats.org/presentationml/2006/main">
   <p:cSld>
     <p:spTree>
@@ -1119,7 +1208,7 @@
             <a:fld id="{1449AA12-8195-4182-A7AC-2E7E59DFBDAF}" type="datetimeFigureOut">
               <a:rPr lang="en-US" smtClean="0"/>
               <a:pPr algn="r"/>
-              <a:t>10/30/24</a:t>
+              <a:t>10/31/24</a:t>
             </a:fld>
             <a:endParaRPr lang="en-US"/>
           </a:p>
@@ -1335,7 +1424,7 @@
           <a:p>
             <a:fld id="{1449AA12-8195-4182-A7AC-2E7E59DFBDAF}" type="datetimeFigureOut">
               <a:rPr lang="en-US" smtClean="0"/>
-              <a:t>10/30/24</a:t>
+              <a:t>10/31/24</a:t>
             </a:fld>
             <a:endParaRPr lang="en-US"/>
           </a:p>
@@ -1707,7 +1796,7 @@
           <a:p>
             <a:fld id="{1449AA12-8195-4182-A7AC-2E7E59DFBDAF}" type="datetimeFigureOut">
               <a:rPr lang="en-US" smtClean="0"/>
-              <a:t>10/30/24</a:t>
+              <a:t>10/31/24</a:t>
             </a:fld>
             <a:endParaRPr lang="en-US"/>
           </a:p>
@@ -2069,7 +2158,7 @@
           <a:p>
             <a:fld id="{1449AA12-8195-4182-A7AC-2E7E59DFBDAF}" type="datetimeFigureOut">
               <a:rPr lang="en-US" smtClean="0"/>
-              <a:t>10/30/24</a:t>
+              <a:t>10/31/24</a:t>
             </a:fld>
             <a:endParaRPr lang="en-US"/>
           </a:p>
@@ -2509,7 +2598,7 @@
           <a:p>
             <a:fld id="{1449AA12-8195-4182-A7AC-2E7E59DFBDAF}" type="datetimeFigureOut">
               <a:rPr lang="en-US" smtClean="0"/>
-              <a:t>10/30/24</a:t>
+              <a:t>10/31/24</a:t>
             </a:fld>
             <a:endParaRPr lang="en-US"/>
           </a:p>
@@ -2949,7 +3038,7 @@
           <a:p>
             <a:fld id="{1449AA12-8195-4182-A7AC-2E7E59DFBDAF}" type="datetimeFigureOut">
               <a:rPr lang="en-US" smtClean="0"/>
-              <a:t>10/30/24</a:t>
+              <a:t>10/31/24</a:t>
             </a:fld>
             <a:endParaRPr lang="en-US"/>
           </a:p>
@@ -3557,7 +3646,7 @@
           <a:p>
             <a:fld id="{1449AA12-8195-4182-A7AC-2E7E59DFBDAF}" type="datetimeFigureOut">
               <a:rPr lang="en-US" smtClean="0"/>
-              <a:t>10/30/24</a:t>
+              <a:t>10/31/24</a:t>
             </a:fld>
             <a:endParaRPr lang="en-US"/>
           </a:p>
@@ -3862,7 +3951,7 @@
           <a:p>
             <a:fld id="{1449AA12-8195-4182-A7AC-2E7E59DFBDAF}" type="datetimeFigureOut">
               <a:rPr lang="en-US" smtClean="0"/>
-              <a:t>10/30/24</a:t>
+              <a:t>10/31/24</a:t>
             </a:fld>
             <a:endParaRPr lang="en-US"/>
           </a:p>
@@ -4139,7 +4228,7 @@
           <a:p>
             <a:fld id="{1449AA12-8195-4182-A7AC-2E7E59DFBDAF}" type="datetimeFigureOut">
               <a:rPr lang="en-US" smtClean="0"/>
-              <a:t>10/30/24</a:t>
+              <a:t>10/31/24</a:t>
             </a:fld>
             <a:endParaRPr lang="en-US"/>
           </a:p>
@@ -4616,7 +4705,7 @@
           <a:p>
             <a:fld id="{1449AA12-8195-4182-A7AC-2E7E59DFBDAF}" type="datetimeFigureOut">
               <a:rPr lang="en-US" smtClean="0"/>
-              <a:t>10/30/24</a:t>
+              <a:t>10/31/24</a:t>
             </a:fld>
             <a:endParaRPr lang="en-US"/>
           </a:p>
@@ -5071,7 +5160,7 @@
           <a:p>
             <a:fld id="{1449AA12-8195-4182-A7AC-2E7E59DFBDAF}" type="datetimeFigureOut">
               <a:rPr lang="en-US" smtClean="0"/>
-              <a:t>10/30/24</a:t>
+              <a:t>10/31/24</a:t>
             </a:fld>
             <a:endParaRPr lang="en-US"/>
           </a:p>
@@ -5477,7 +5566,7 @@
             <a:fld id="{1449AA12-8195-4182-A7AC-2E7E59DFBDAF}" type="datetimeFigureOut">
               <a:rPr lang="en-US" smtClean="0"/>
               <a:pPr/>
-              <a:t>10/30/24</a:t>
+              <a:t>10/31/24</a:t>
             </a:fld>
             <a:endParaRPr lang="en-US"/>
           </a:p>
@@ -6707,22 +6796,13 @@
             </a:r>
           </a:p>
           <a:p>
-            <a:pPr marL="0" indent="0">
+            <a:pPr marL="457200" indent="-457200">
               <a:buClr>
                 <a:srgbClr val="C00000"/>
               </a:buClr>
-              <a:buNone/>
+              <a:buFont typeface="+mj-lt"/>
+              <a:buAutoNum type="arabicPeriod"/>
             </a:pPr>
-            <a:r>
-              <a:rPr lang="en-GB" b="0" dirty="0">
-                <a:solidFill>
-                  <a:srgbClr val="CCCCCC"/>
-                </a:solidFill>
-                <a:effectLst/>
-                <a:latin typeface="Menlo" panose="020B0609030804020204" pitchFamily="49" charset="0"/>
-              </a:rPr>
-              <a:t>1. </a:t>
-            </a:r>
             <a:r>
               <a:rPr lang="en-GB" dirty="0">
                 <a:solidFill>
@@ -7628,16 +7708,155 @@
                 </a:solidFill>
                 <a:latin typeface="Menlo" panose="020B0609030804020204" pitchFamily="49" charset="0"/>
               </a:rPr>
+              <a:t> GitHub</a:t>
+            </a:r>
+          </a:p>
+          <a:p>
+            <a:pPr marL="0" indent="0">
+              <a:buNone/>
+            </a:pPr>
+            <a:r>
+              <a:rPr lang="en-GB" sz="1700" dirty="0">
+                <a:solidFill>
+                  <a:srgbClr val="C00000"/>
+                </a:solidFill>
+                <a:highlight>
+                  <a:srgbClr val="C0C0C0"/>
+                </a:highlight>
+                <a:latin typeface="Menlo" panose="020B0609030804020204" pitchFamily="49" charset="0"/>
+              </a:rPr>
+              <a:t>Project management:</a:t>
+            </a:r>
+            <a:r>
+              <a:rPr lang="en-GB" sz="1700" dirty="0">
+                <a:solidFill>
+                  <a:srgbClr val="CCCCCC"/>
+                </a:solidFill>
+                <a:latin typeface="Menlo" panose="020B0609030804020204" pitchFamily="49" charset="0"/>
+              </a:rPr>
+              <a:t> Trello</a:t>
+            </a:r>
+          </a:p>
+          <a:p>
+            <a:pPr marL="0" indent="0">
+              <a:buNone/>
+            </a:pPr>
+            <a:r>
+              <a:rPr lang="en-GB" sz="1700" dirty="0">
+                <a:solidFill>
+                  <a:srgbClr val="C00000"/>
+                </a:solidFill>
+                <a:highlight>
+                  <a:srgbClr val="C0C0C0"/>
+                </a:highlight>
+                <a:latin typeface="Menlo" panose="020B0609030804020204" pitchFamily="49" charset="0"/>
+              </a:rPr>
+              <a:t>Prototyping and creating UX/UI:</a:t>
+            </a:r>
+            <a:r>
+              <a:rPr lang="en-GB" sz="1700" dirty="0">
+                <a:solidFill>
+                  <a:srgbClr val="CCCCCC"/>
+                </a:solidFill>
+                <a:latin typeface="Menlo" panose="020B0609030804020204" pitchFamily="49" charset="0"/>
+              </a:rPr>
+              <a:t> Figma</a:t>
+            </a:r>
+          </a:p>
+          <a:p>
+            <a:pPr marL="0" indent="0">
+              <a:buNone/>
+            </a:pPr>
+            <a:r>
+              <a:rPr lang="en-GB" sz="1700" dirty="0">
+                <a:solidFill>
+                  <a:srgbClr val="C00000"/>
+                </a:solidFill>
+                <a:highlight>
+                  <a:srgbClr val="C0C0C0"/>
+                </a:highlight>
+                <a:latin typeface="Menlo" panose="020B0609030804020204" pitchFamily="49" charset="0"/>
+              </a:rPr>
+              <a:t>Frontend:</a:t>
+            </a:r>
+            <a:r>
+              <a:rPr lang="en-GB" sz="1700" dirty="0">
+                <a:solidFill>
+                  <a:srgbClr val="C00000"/>
+                </a:solidFill>
+                <a:latin typeface="Menlo" panose="020B0609030804020204" pitchFamily="49" charset="0"/>
+              </a:rPr>
               <a:t> </a:t>
             </a:r>
             <a:r>
+              <a:rPr lang="en-GB" sz="1700" dirty="0">
+                <a:solidFill>
+                  <a:srgbClr val="CCCCCC"/>
+                </a:solidFill>
+                <a:latin typeface="Menlo" panose="020B0609030804020204" pitchFamily="49" charset="0"/>
+              </a:rPr>
+              <a:t>React</a:t>
+            </a:r>
+          </a:p>
+          <a:p>
+            <a:pPr marL="0" indent="0">
+              <a:buNone/>
+            </a:pPr>
+            <a:r>
+              <a:rPr lang="en-GB" sz="1700" dirty="0">
+                <a:solidFill>
+                  <a:srgbClr val="C00000"/>
+                </a:solidFill>
+                <a:highlight>
+                  <a:srgbClr val="C0C0C0"/>
+                </a:highlight>
+                <a:latin typeface="Menlo" panose="020B0609030804020204" pitchFamily="49" charset="0"/>
+              </a:rPr>
+              <a:t>Backend:</a:t>
+            </a:r>
+            <a:r>
+              <a:rPr lang="en-GB" sz="1700" dirty="0">
+                <a:solidFill>
+                  <a:srgbClr val="CCCCCC"/>
+                </a:solidFill>
+                <a:latin typeface="Menlo" panose="020B0609030804020204" pitchFamily="49" charset="0"/>
+              </a:rPr>
+              <a:t> Node.js with Express</a:t>
+            </a:r>
+          </a:p>
+          <a:p>
+            <a:pPr marL="0" indent="0">
+              <a:buNone/>
+            </a:pPr>
+            <a:r>
+              <a:rPr lang="en-GB" sz="1700" dirty="0">
+                <a:solidFill>
+                  <a:srgbClr val="C00000"/>
+                </a:solidFill>
+                <a:highlight>
+                  <a:srgbClr val="C0C0C0"/>
+                </a:highlight>
+                <a:latin typeface="Menlo" panose="020B0609030804020204" pitchFamily="49" charset="0"/>
+              </a:rPr>
+              <a:t>Database:</a:t>
+            </a:r>
+            <a:r>
+              <a:rPr lang="en-GB" sz="1700" dirty="0">
+                <a:solidFill>
+                  <a:srgbClr val="CCCCCC"/>
+                </a:solidFill>
+                <a:latin typeface="Menlo" panose="020B0609030804020204" pitchFamily="49" charset="0"/>
+              </a:rPr>
+              <a:t> </a:t>
+            </a:r>
+            <a:r>
               <a:rPr lang="en-GB" sz="1700" dirty="0" err="1">
                 <a:solidFill>
                   <a:srgbClr val="CCCCCC"/>
                 </a:solidFill>
                 <a:latin typeface="Menlo" panose="020B0609030804020204" pitchFamily="49" charset="0"/>
               </a:rPr>
-              <a:t>GirHub</a:t>
+              <a:t>MariaBD</a:t>
             </a:r>
             <a:endParaRPr lang="en-GB" sz="1700" dirty="0">
               <a:solidFill>
@@ -7660,7 +7879,7 @@
                 </a:highlight>
                 <a:latin typeface="Menlo" panose="020B0609030804020204" pitchFamily="49" charset="0"/>
               </a:rPr>
-              <a:t>Project management:</a:t>
+              <a:t>Style guide:</a:t>
             </a:r>
             <a:r>
               <a:rPr lang="en-GB" sz="1700" dirty="0">
@@ -7669,149 +7888,7 @@
                 </a:solidFill>
                 <a:latin typeface="Menlo" panose="020B0609030804020204" pitchFamily="49" charset="0"/>
               </a:rPr>
-              <a:t> Trello</a:t>
-            </a:r>
-          </a:p>
-          <a:p>
-            <a:pPr marL="0" indent="0">
-              <a:buNone/>
-            </a:pPr>
-            <a:r>
-              <a:rPr lang="en-GB" sz="1700" dirty="0">
-                <a:solidFill>
-                  <a:srgbClr val="CCCCCC"/>
-                </a:solidFill>
-                <a:latin typeface="Menlo" panose="020B0609030804020204" pitchFamily="49" charset="0"/>
-              </a:rPr>
-              <a:t>Prototyping and creating UX/UI: Figma</a:t>
-            </a:r>
-          </a:p>
-          <a:p>
-            <a:pPr marL="0" indent="0">
-              <a:buNone/>
-            </a:pPr>
-            <a:r>
-              <a:rPr lang="en-GB" sz="1700" dirty="0">
-                <a:solidFill>
-                  <a:srgbClr val="C00000"/>
-                </a:solidFill>
-                <a:highlight>
-                  <a:srgbClr val="C0C0C0"/>
-                </a:highlight>
-                <a:latin typeface="Menlo" panose="020B0609030804020204" pitchFamily="49" charset="0"/>
-              </a:rPr>
-              <a:t>Frontend:</a:t>
-            </a:r>
-            <a:r>
-              <a:rPr lang="en-GB" sz="1700" dirty="0">
-                <a:solidFill>
-                  <a:srgbClr val="C00000"/>
-                </a:solidFill>
-                <a:latin typeface="Menlo" panose="020B0609030804020204" pitchFamily="49" charset="0"/>
-              </a:rPr>
               <a:t> </a:t>
-            </a:r>
-            <a:r>
-              <a:rPr lang="en-GB" sz="1700" dirty="0">
-                <a:solidFill>
-                  <a:srgbClr val="CCCCCC"/>
-                </a:solidFill>
-                <a:latin typeface="Menlo" panose="020B0609030804020204" pitchFamily="49" charset="0"/>
-              </a:rPr>
-              <a:t>React</a:t>
-            </a:r>
-          </a:p>
-          <a:p>
-            <a:pPr marL="0" indent="0">
-              <a:buNone/>
-            </a:pPr>
-            <a:r>
-              <a:rPr lang="en-GB" sz="1700" dirty="0">
-                <a:solidFill>
-                  <a:srgbClr val="C00000"/>
-                </a:solidFill>
-                <a:highlight>
-                  <a:srgbClr val="C0C0C0"/>
-                </a:highlight>
-                <a:latin typeface="Menlo" panose="020B0609030804020204" pitchFamily="49" charset="0"/>
-              </a:rPr>
-              <a:t>Backend:</a:t>
-            </a:r>
-            <a:r>
-              <a:rPr lang="en-GB" sz="1700" dirty="0">
-                <a:solidFill>
-                  <a:srgbClr val="CCCCCC"/>
-                </a:solidFill>
-                <a:latin typeface="Menlo" panose="020B0609030804020204" pitchFamily="49" charset="0"/>
-              </a:rPr>
-              <a:t> Node.js with Express</a:t>
-            </a:r>
-          </a:p>
-          <a:p>
-            <a:pPr marL="0" indent="0">
-              <a:buNone/>
-            </a:pPr>
-            <a:r>
-              <a:rPr lang="en-GB" sz="1700" dirty="0">
-                <a:solidFill>
-                  <a:srgbClr val="C00000"/>
-                </a:solidFill>
-                <a:highlight>
-                  <a:srgbClr val="C0C0C0"/>
-                </a:highlight>
-                <a:latin typeface="Menlo" panose="020B0609030804020204" pitchFamily="49" charset="0"/>
-              </a:rPr>
-              <a:t>Database:</a:t>
-            </a:r>
-            <a:r>
-              <a:rPr lang="en-GB" sz="1700" dirty="0">
-                <a:solidFill>
-                  <a:srgbClr val="CCCCCC"/>
-                </a:solidFill>
-                <a:latin typeface="Menlo" panose="020B0609030804020204" pitchFamily="49" charset="0"/>
-              </a:rPr>
-              <a:t> </a:t>
-            </a:r>
-            <a:r>
-              <a:rPr lang="en-GB" sz="1700" dirty="0" err="1">
-                <a:solidFill>
-                  <a:srgbClr val="CCCCCC"/>
-                </a:solidFill>
-                <a:latin typeface="Menlo" panose="020B0609030804020204" pitchFamily="49" charset="0"/>
-              </a:rPr>
-              <a:t>MariaBD</a:t>
-            </a:r>
-            <a:endParaRPr lang="en-GB" sz="1700" dirty="0">
-              <a:solidFill>
-                <a:srgbClr val="CCCCCC"/>
-              </a:solidFill>
-              <a:latin typeface="Menlo" panose="020B0609030804020204" pitchFamily="49" charset="0"/>
-            </a:endParaRPr>
-          </a:p>
-          <a:p>
-            <a:pPr marL="0" indent="0">
-              <a:buNone/>
-            </a:pPr>
-            <a:r>
-              <a:rPr lang="en-GB" sz="1700" dirty="0">
-                <a:solidFill>
-                  <a:srgbClr val="C00000"/>
-                </a:solidFill>
-                <a:highlight>
-                  <a:srgbClr val="C0C0C0"/>
-                </a:highlight>
-                <a:latin typeface="Menlo" panose="020B0609030804020204" pitchFamily="49" charset="0"/>
-              </a:rPr>
-              <a:t>Art Design:</a:t>
-            </a:r>
-            <a:r>
-              <a:rPr lang="en-GB" sz="1700" dirty="0">
-                <a:solidFill>
-                  <a:srgbClr val="CCCCCC"/>
-                </a:solidFill>
-                <a:latin typeface="Menlo" panose="020B0609030804020204" pitchFamily="49" charset="0"/>
-              </a:rPr>
-              <a:t> **???** </a:t>
             </a:r>
             <a:r>
               <a:rPr lang="en-GB" sz="1700" dirty="0">
@@ -7823,31 +7900,7 @@
                 </a:highlight>
                 <a:latin typeface="Menlo" panose="020B0609030804020204" pitchFamily="49" charset="0"/>
               </a:rPr>
-              <a:t>Hope </a:t>
-            </a:r>
-            <a:r>
-              <a:rPr lang="en-GB" sz="1700" dirty="0" err="1">
-                <a:solidFill>
-                  <a:schemeClr val="bg1"/>
-                </a:solidFill>
-                <a:highlight>
-                  <a:srgbClr val="FFFF00"/>
-                </a:highlight>
-                <a:latin typeface="Menlo" panose="020B0609030804020204" pitchFamily="49" charset="0"/>
-              </a:rPr>
-              <a:t>Saara</a:t>
-            </a:r>
-            <a:r>
-              <a:rPr lang="en-GB" sz="1700" dirty="0">
-                <a:solidFill>
-                  <a:schemeClr val="bg1"/>
-                </a:solidFill>
-                <a:highlight>
-                  <a:srgbClr val="FFFF00"/>
-                </a:highlight>
-                <a:latin typeface="Menlo" panose="020B0609030804020204" pitchFamily="49" charset="0"/>
-              </a:rPr>
-              <a:t> can suggest something</a:t>
+              <a:t>decide later</a:t>
             </a:r>
           </a:p>
         </p:txBody>
@@ -8167,7 +8220,39 @@
                 </a:highlight>
                 <a:latin typeface="Menlo" panose="020B0609030804020204" pitchFamily="49" charset="0"/>
               </a:rPr>
-              <a:t>decide on Thursday</a:t>
+              <a:t>decide later</a:t>
+            </a:r>
+          </a:p>
+          <a:p>
+            <a:pPr marL="0" indent="0">
+              <a:buNone/>
+            </a:pPr>
+            <a:r>
+              <a:rPr lang="en-GB" sz="1700" dirty="0" err="1">
+                <a:solidFill>
+                  <a:srgbClr val="C00000"/>
+                </a:solidFill>
+                <a:latin typeface="Menlo" panose="020B0609030804020204" pitchFamily="49" charset="0"/>
+              </a:rPr>
+              <a:t>Phaser.io</a:t>
+            </a:r>
+            <a:r>
+              <a:rPr lang="en-GB" sz="1700" dirty="0">
+                <a:solidFill>
+                  <a:srgbClr val="C00000"/>
+                </a:solidFill>
+                <a:latin typeface="Menlo" panose="020B0609030804020204" pitchFamily="49" charset="0"/>
+              </a:rPr>
+              <a:t> framework </a:t>
+            </a:r>
+            <a:r>
+              <a:rPr lang="en-GB" sz="1700" dirty="0">
+                <a:solidFill>
+                  <a:srgbClr val="CCCCCC"/>
+                </a:solidFill>
+                <a:latin typeface="Menlo" panose="020B0609030804020204" pitchFamily="49" charset="0"/>
+              </a:rPr>
+              <a:t>for gameplay  mechanics</a:t>
             </a:r>
           </a:p>
           <a:p>
@@ -8262,15 +8347,6 @@
             <a:r>
               <a:rPr lang="en-GB" sz="1700" dirty="0">
                 <a:solidFill>
-                  <a:srgbClr val="CCCCCC"/>
-                </a:solidFill>
-                <a:latin typeface="Menlo" panose="020B0609030804020204" pitchFamily="49" charset="0"/>
-              </a:rPr>
-              <a:t>**???** </a:t>
-            </a:r>
-            <a:r>
-              <a:rPr lang="en-GB" sz="1700" dirty="0">
-                <a:solidFill>
                   <a:schemeClr val="bg1"/>
                 </a:solidFill>
                 <a:highlight>
@@ -8278,7 +8354,7 @@
                 </a:highlight>
                 <a:latin typeface="Menlo" panose="020B0609030804020204" pitchFamily="49" charset="0"/>
               </a:rPr>
-              <a:t>Stefanie will look for some</a:t>
+              <a:t>decide later</a:t>
             </a:r>
           </a:p>
         </p:txBody>
@@ -8817,7 +8893,7 @@
                 </a:highlight>
                 <a:latin typeface="Menlo" panose="020B0609030804020204" pitchFamily="49" charset="0"/>
               </a:rPr>
-              <a:t>Time Management and Team Coordination</a:t>
+              <a:t>Time Management and Team Coordination:</a:t>
             </a:r>
           </a:p>
           <a:p>
@@ -8891,7 +8967,7 @@
                 </a:highlight>
                 <a:latin typeface="Menlo" panose="020B0609030804020204" pitchFamily="49" charset="0"/>
               </a:rPr>
-              <a:t>Game Art and Visual Consistency</a:t>
+              <a:t>Game Art and Visual Consistency:</a:t>
             </a:r>
           </a:p>
           <a:p>

</xml_diff>

<commit_message>
docs: fix some more minor stuff in the presentation
</commit_message>
<xml_diff>
--- a/project_design/Project_presentation_v1.pptx
+++ b/project_design/Project_presentation_v1.pptx
@@ -6102,7 +6102,7 @@
                   <a:srgbClr val="FFFFFF"/>
                 </a:solidFill>
               </a:rPr>
-              <a:t>Scriptory</a:t>
+              <a:t>Timelink</a:t>
             </a:r>
             <a:br>
               <a:rPr lang="en-FI" sz="4800" dirty="0">
@@ -6573,7 +6573,7 @@
                 <a:effectLst/>
                 <a:latin typeface="Menlo" panose="020B0609030804020204" pitchFamily="49" charset="0"/>
               </a:rPr>
-              <a:t>The playground field consists of different historical ages (the Timeline), which user needs to pass through to win.</a:t>
+              <a:t>The playground field consists of different historical ages, which user needs to pass through to win.</a:t>
             </a:r>
           </a:p>
           <a:p>
@@ -6587,7 +6587,25 @@
                 </a:solidFill>
                 <a:latin typeface="Menlo" panose="020B0609030804020204" pitchFamily="49" charset="0"/>
               </a:rPr>
-              <a:t>On every move user gets a new task to solve. Every correct answer allows to continue the movement along the Timeline.</a:t>
+              <a:t>On every move user gets a new task to solve. Every correct answer allows to continue the movement along the </a:t>
+            </a:r>
+            <a:r>
+              <a:rPr lang="en-GB" sz="2000" dirty="0" err="1">
+                <a:solidFill>
+                  <a:schemeClr val="tx2"/>
+                </a:solidFill>
+                <a:latin typeface="Menlo" panose="020B0609030804020204" pitchFamily="49" charset="0"/>
+              </a:rPr>
+              <a:t>Timelink</a:t>
+            </a:r>
+            <a:r>
+              <a:rPr lang="en-GB" sz="2000" dirty="0">
+                <a:solidFill>
+                  <a:schemeClr val="tx2"/>
+                </a:solidFill>
+                <a:latin typeface="Menlo" panose="020B0609030804020204" pitchFamily="49" charset="0"/>
+              </a:rPr>
+              <a:t>.</a:t>
             </a:r>
           </a:p>
           <a:p>

</xml_diff>

<commit_message>
add wireframe to class presentation
</commit_message>
<xml_diff>
--- a/project_design/Project_presentation_v1.pptx
+++ b/project_design/Project_presentation_v1.pptx
@@ -205,7 +205,7 @@
           <a:p>
             <a:fld id="{D9360710-82AB-E741-94A5-3EBA87CE8918}" type="datetimeFigureOut">
               <a:rPr lang="en-FI" smtClean="0"/>
-              <a:t>31.10.2024</a:t>
+              <a:t>10/31/24</a:t>
             </a:fld>
             <a:endParaRPr lang="en-FI"/>
           </a:p>
@@ -6154,21 +6154,38 @@
         </p:spPr>
         <p:txBody>
           <a:bodyPr>
-            <a:normAutofit/>
+            <a:normAutofit fontScale="92500" lnSpcReduction="10000"/>
           </a:bodyPr>
           <a:lstStyle/>
           <a:p>
             <a:pPr algn="ctr"/>
             <a:r>
-              <a:rPr lang="en-FI" sz="3600" dirty="0">
+              <a:rPr lang="en-FI" sz="3600">
                 <a:solidFill>
                   <a:srgbClr val="FFFFFF"/>
                 </a:solidFill>
               </a:rPr>
               <a:t>TEAM 2</a:t>
             </a:r>
-          </a:p>
-          <a:p>
+            <a:r>
+              <a:rPr lang="fi-FI" sz="3600" dirty="0">
+                <a:solidFill>
+                  <a:srgbClr val="FFFFFF"/>
+                </a:solidFill>
+              </a:rPr>
+              <a:t>:</a:t>
+            </a:r>
+          </a:p>
+          <a:p>
+            <a:pPr algn="ctr"/>
+            <a:r>
+              <a:rPr lang="fi-FI" sz="3600">
+                <a:solidFill>
+                  <a:srgbClr val="FFFFFF"/>
+                </a:solidFill>
+              </a:rPr>
+              <a:t>TimeShifters</a:t>
+            </a:r>
             <a:endParaRPr lang="en-FI" dirty="0"/>
           </a:p>
         </p:txBody>
@@ -6663,6 +6680,68 @@
               </a:rPr>
               <a:t>ncert wireframe here</a:t>
             </a:r>
+          </a:p>
+        </p:txBody>
+      </p:sp>
+      <p:pic>
+        <p:nvPicPr>
+          <p:cNvPr id="6" name="Picture 5" descr="A screenshot of a game&#10;&#10;Description automatically generated">
+            <a:extLst>
+              <a:ext uri="{FF2B5EF4-FFF2-40B4-BE49-F238E27FC236}">
+                <a16:creationId xmlns:a16="http://schemas.microsoft.com/office/drawing/2014/main" id="{50D1C013-AB76-5BE5-E5D2-3361A20A47AC}"/>
+              </a:ext>
+            </a:extLst>
+          </p:cNvPr>
+          <p:cNvPicPr>
+            <a:picLocks noChangeAspect="1"/>
+          </p:cNvPicPr>
+          <p:nvPr/>
+        </p:nvPicPr>
+        <p:blipFill>
+          <a:blip r:embed="rId2"/>
+          <a:stretch>
+            <a:fillRect/>
+          </a:stretch>
+        </p:blipFill>
+        <p:spPr>
+          <a:xfrm>
+            <a:off x="7508532" y="1834243"/>
+            <a:ext cx="4485255" cy="3189514"/>
+          </a:xfrm>
+          <a:prstGeom prst="rect">
+            <a:avLst/>
+          </a:prstGeom>
+        </p:spPr>
+      </p:pic>
+      <p:sp>
+        <p:nvSpPr>
+          <p:cNvPr id="7" name="TextBox 6">
+            <a:extLst>
+              <a:ext uri="{FF2B5EF4-FFF2-40B4-BE49-F238E27FC236}">
+                <a16:creationId xmlns:a16="http://schemas.microsoft.com/office/drawing/2014/main" id="{FE74CA3C-44A9-C61E-87D1-C0F579F35B16}"/>
+              </a:ext>
+            </a:extLst>
+          </p:cNvPr>
+          <p:cNvSpPr txBox="1"/>
+          <p:nvPr/>
+        </p:nvSpPr>
+        <p:spPr>
+          <a:xfrm>
+            <a:off x="827314" y="1295400"/>
+            <a:ext cx="184731" cy="369332"/>
+          </a:xfrm>
+          <a:prstGeom prst="rect">
+            <a:avLst/>
+          </a:prstGeom>
+          <a:noFill/>
+        </p:spPr>
+        <p:txBody>
+          <a:bodyPr wrap="none" rtlCol="0">
+            <a:spAutoFit/>
+          </a:bodyPr>
+          <a:lstStyle/>
+          <a:p>
+            <a:endParaRPr lang="en-US" dirty="0"/>
           </a:p>
         </p:txBody>
       </p:sp>

</xml_diff>

<commit_message>
docs: add wireframe img
</commit_message>
<xml_diff>
--- a/project_design/Project_presentation_v1.pptx
+++ b/project_design/Project_presentation_v1.pptx
@@ -6179,7 +6179,7 @@
           <a:p>
             <a:pPr algn="ctr"/>
             <a:r>
-              <a:rPr lang="fi-FI" sz="3600">
+              <a:rPr lang="fi-FI" sz="3600" dirty="0">
                 <a:solidFill>
                   <a:srgbClr val="FFFFFF"/>
                 </a:solidFill>
@@ -6489,7 +6489,7 @@
           <a:lstStyle/>
           <a:p>
             <a:r>
-              <a:rPr lang="en-GB" i="0" dirty="0">
+              <a:rPr lang="en-GB" i="0">
                 <a:solidFill>
                   <a:schemeClr val="tx2"/>
                 </a:solidFill>
@@ -6520,8 +6520,8 @@
         </p:nvSpPr>
         <p:spPr>
           <a:xfrm>
-            <a:off x="1587710" y="1334814"/>
-            <a:ext cx="5855506" cy="5076000"/>
+            <a:off x="1602988" y="1480066"/>
+            <a:ext cx="4844722" cy="5076000"/>
           </a:xfrm>
         </p:spPr>
         <p:txBody>
@@ -6590,7 +6590,26 @@
                 <a:effectLst/>
                 <a:latin typeface="Menlo" panose="020B0609030804020204" pitchFamily="49" charset="0"/>
               </a:rPr>
-              <a:t>The playground field consists of different historical ages, which user needs to pass through to win.</a:t>
+              <a:t>The playground field consists of different ages/eras in </a:t>
+            </a:r>
+            <a:r>
+              <a:rPr lang="en-GB" sz="2000" dirty="0">
+                <a:solidFill>
+                  <a:schemeClr val="tx2"/>
+                </a:solidFill>
+                <a:latin typeface="Menlo" panose="020B0609030804020204" pitchFamily="49" charset="0"/>
+              </a:rPr>
+              <a:t>Earth </a:t>
+            </a:r>
+            <a:r>
+              <a:rPr lang="en-GB" sz="2000" b="0" dirty="0">
+                <a:solidFill>
+                  <a:schemeClr val="tx2"/>
+                </a:solidFill>
+                <a:effectLst/>
+                <a:latin typeface="Menlo" panose="020B0609030804020204" pitchFamily="49" charset="0"/>
+              </a:rPr>
+              <a:t>history, which user needs to pass through to win.</a:t>
             </a:r>
           </a:p>
           <a:p>
@@ -6604,25 +6623,7 @@
                 </a:solidFill>
                 <a:latin typeface="Menlo" panose="020B0609030804020204" pitchFamily="49" charset="0"/>
               </a:rPr>
-              <a:t>On every move user gets a new task to solve. Every correct answer allows to continue the movement along the </a:t>
-            </a:r>
-            <a:r>
-              <a:rPr lang="en-GB" sz="2000" dirty="0" err="1">
-                <a:solidFill>
-                  <a:schemeClr val="tx2"/>
-                </a:solidFill>
-                <a:latin typeface="Menlo" panose="020B0609030804020204" pitchFamily="49" charset="0"/>
-              </a:rPr>
-              <a:t>Timelink</a:t>
-            </a:r>
-            <a:r>
-              <a:rPr lang="en-GB" sz="2000" dirty="0">
-                <a:solidFill>
-                  <a:schemeClr val="tx2"/>
-                </a:solidFill>
-                <a:latin typeface="Menlo" panose="020B0609030804020204" pitchFamily="49" charset="0"/>
-              </a:rPr>
-              <a:t>.</a:t>
+              <a:t>On every move user gets a new task to solve. Every correct answer allows to continue the movement along the Timelink.</a:t>
             </a:r>
           </a:p>
           <a:p>
@@ -6632,10 +6633,10 @@
       </p:sp>
       <p:sp>
         <p:nvSpPr>
-          <p:cNvPr id="5" name="TextBox 4">
-            <a:extLst>
-              <a:ext uri="{FF2B5EF4-FFF2-40B4-BE49-F238E27FC236}">
-                <a16:creationId xmlns:a16="http://schemas.microsoft.com/office/drawing/2014/main" id="{8281618E-4605-FF33-A82D-A99FC03A46C1}"/>
+          <p:cNvPr id="7" name="TextBox 6">
+            <a:extLst>
+              <a:ext uri="{FF2B5EF4-FFF2-40B4-BE49-F238E27FC236}">
+                <a16:creationId xmlns:a16="http://schemas.microsoft.com/office/drawing/2014/main" id="{FE74CA3C-44A9-C61E-87D1-C0F579F35B16}"/>
               </a:ext>
             </a:extLst>
           </p:cNvPr>
@@ -6644,8 +6645,8 @@
         </p:nvSpPr>
         <p:spPr>
           <a:xfrm>
-            <a:off x="8312028" y="3429000"/>
-            <a:ext cx="2480807" cy="369332"/>
+            <a:off x="827314" y="1295400"/>
+            <a:ext cx="184731" cy="369332"/>
           </a:xfrm>
           <a:prstGeom prst="rect">
             <a:avLst/>
@@ -6658,37 +6659,16 @@
           </a:bodyPr>
           <a:lstStyle/>
           <a:p>
-            <a:r>
-              <a:rPr lang="en-GB" i="1" dirty="0">
-                <a:solidFill>
-                  <a:srgbClr val="FF0000"/>
-                </a:solidFill>
-                <a:highlight>
-                  <a:srgbClr val="FFFF00"/>
-                </a:highlight>
-              </a:rPr>
-              <a:t>I</a:t>
-            </a:r>
-            <a:r>
-              <a:rPr lang="en-FI" i="1" dirty="0">
-                <a:solidFill>
-                  <a:srgbClr val="FF0000"/>
-                </a:solidFill>
-                <a:highlight>
-                  <a:srgbClr val="FFFF00"/>
-                </a:highlight>
-              </a:rPr>
-              <a:t>ncert wireframe here</a:t>
-            </a:r>
+            <a:endParaRPr lang="en-US" dirty="0"/>
           </a:p>
         </p:txBody>
       </p:sp>
       <p:pic>
         <p:nvPicPr>
-          <p:cNvPr id="6" name="Picture 5" descr="A screenshot of a game&#10;&#10;Description automatically generated">
-            <a:extLst>
-              <a:ext uri="{FF2B5EF4-FFF2-40B4-BE49-F238E27FC236}">
-                <a16:creationId xmlns:a16="http://schemas.microsoft.com/office/drawing/2014/main" id="{50D1C013-AB76-5BE5-E5D2-3361A20A47AC}"/>
+          <p:cNvPr id="12" name="Picture 11" descr="A screenshot of a game&#10;&#10;Description automatically generated">
+            <a:extLst>
+              <a:ext uri="{FF2B5EF4-FFF2-40B4-BE49-F238E27FC236}">
+                <a16:creationId xmlns:a16="http://schemas.microsoft.com/office/drawing/2014/main" id="{360B23B1-9B37-A164-D68A-5B37C7AE3DF1}"/>
               </a:ext>
             </a:extLst>
           </p:cNvPr>
@@ -6705,46 +6685,14 @@
         </p:blipFill>
         <p:spPr>
           <a:xfrm>
-            <a:off x="7508532" y="1834243"/>
-            <a:ext cx="4485255" cy="3189514"/>
+            <a:off x="6575612" y="2132647"/>
+            <a:ext cx="5302741" cy="3770837"/>
           </a:xfrm>
           <a:prstGeom prst="rect">
             <a:avLst/>
           </a:prstGeom>
         </p:spPr>
       </p:pic>
-      <p:sp>
-        <p:nvSpPr>
-          <p:cNvPr id="7" name="TextBox 6">
-            <a:extLst>
-              <a:ext uri="{FF2B5EF4-FFF2-40B4-BE49-F238E27FC236}">
-                <a16:creationId xmlns:a16="http://schemas.microsoft.com/office/drawing/2014/main" id="{FE74CA3C-44A9-C61E-87D1-C0F579F35B16}"/>
-              </a:ext>
-            </a:extLst>
-          </p:cNvPr>
-          <p:cNvSpPr txBox="1"/>
-          <p:nvPr/>
-        </p:nvSpPr>
-        <p:spPr>
-          <a:xfrm>
-            <a:off x="827314" y="1295400"/>
-            <a:ext cx="184731" cy="369332"/>
-          </a:xfrm>
-          <a:prstGeom prst="rect">
-            <a:avLst/>
-          </a:prstGeom>
-          <a:noFill/>
-        </p:spPr>
-        <p:txBody>
-          <a:bodyPr wrap="none" rtlCol="0">
-            <a:spAutoFit/>
-          </a:bodyPr>
-          <a:lstStyle/>
-          <a:p>
-            <a:endParaRPr lang="en-US" dirty="0"/>
-          </a:p>
-        </p:txBody>
-      </p:sp>
     </p:spTree>
     <p:extLst>
       <p:ext uri="{BB962C8B-B14F-4D97-AF65-F5344CB8AC3E}">
@@ -6845,7 +6793,7 @@
         </p:spPr>
         <p:txBody>
           <a:bodyPr>
-            <a:normAutofit fontScale="92500" lnSpcReduction="20000"/>
+            <a:normAutofit fontScale="85000" lnSpcReduction="10000"/>
           </a:bodyPr>
           <a:lstStyle/>
           <a:p>
@@ -6865,31 +6813,7 @@
                 </a:highlight>
                 <a:latin typeface="Menlo" panose="020B0609030804020204" pitchFamily="49" charset="0"/>
               </a:rPr>
-              <a:t>Team: Hossain, </a:t>
-            </a:r>
-            <a:r>
-              <a:rPr lang="en-GB" dirty="0" err="1">
-                <a:solidFill>
-                  <a:srgbClr val="C00000"/>
-                </a:solidFill>
-                <a:highlight>
-                  <a:srgbClr val="C0C0C0"/>
-                </a:highlight>
-                <a:latin typeface="Menlo" panose="020B0609030804020204" pitchFamily="49" charset="0"/>
-              </a:rPr>
-              <a:t>Saara</a:t>
-            </a:r>
-            <a:r>
-              <a:rPr lang="en-GB" dirty="0">
-                <a:solidFill>
-                  <a:srgbClr val="C00000"/>
-                </a:solidFill>
-                <a:highlight>
-                  <a:srgbClr val="C0C0C0"/>
-                </a:highlight>
-                <a:latin typeface="Menlo" panose="020B0609030804020204" pitchFamily="49" charset="0"/>
-              </a:rPr>
-              <a:t>, Stefanie, Vladimir</a:t>
+              <a:t>Team: Hossain, Saara, Stefanie, Vladimir</a:t>
             </a:r>
           </a:p>
           <a:p>
@@ -6929,31 +6853,7 @@
                 </a:highlight>
                 <a:latin typeface="Menlo" panose="020B0609030804020204" pitchFamily="49" charset="0"/>
               </a:rPr>
-              <a:t>Hossain, </a:t>
-            </a:r>
-            <a:r>
-              <a:rPr lang="en-GB" dirty="0" err="1">
-                <a:solidFill>
-                  <a:srgbClr val="C00000"/>
-                </a:solidFill>
-                <a:highlight>
-                  <a:srgbClr val="C0C0C0"/>
-                </a:highlight>
-                <a:latin typeface="Menlo" panose="020B0609030804020204" pitchFamily="49" charset="0"/>
-              </a:rPr>
-              <a:t>Saara</a:t>
-            </a:r>
-            <a:r>
-              <a:rPr lang="en-GB" dirty="0">
-                <a:solidFill>
-                  <a:srgbClr val="C00000"/>
-                </a:solidFill>
-                <a:highlight>
-                  <a:srgbClr val="C0C0C0"/>
-                </a:highlight>
-                <a:latin typeface="Menlo" panose="020B0609030804020204" pitchFamily="49" charset="0"/>
-              </a:rPr>
-              <a:t>, Stefanie, Vladimir</a:t>
+              <a:t>Hossain, Saara, Stefanie, Vladimir</a:t>
             </a:r>
           </a:p>
           <a:p>
@@ -7012,19 +6912,19 @@
                 <a:effectLst/>
                 <a:latin typeface="Menlo" panose="020B0609030804020204" pitchFamily="49" charset="0"/>
               </a:rPr>
-              <a:t>Art Designer: c</a:t>
+              <a:t>Game Designer: game mechanics, content creation (story, tasks), and user experience. Easter eggs.</a:t>
             </a:r>
             <a:r>
               <a:rPr lang="en-GB" dirty="0">
                 <a:solidFill>
-                  <a:srgbClr val="CCCCCC"/>
-                </a:solidFill>
-                <a:latin typeface="Menlo" panose="020B0609030804020204" pitchFamily="49" charset="0"/>
-              </a:rPr>
-              <a:t>reates images and designs to make the game look fine. </a:t>
-            </a:r>
-            <a:r>
-              <a:rPr lang="en-GB" dirty="0" err="1">
+                  <a:srgbClr val="C00000"/>
+                </a:solidFill>
+                <a:latin typeface="Menlo" panose="020B0609030804020204" pitchFamily="49" charset="0"/>
+              </a:rPr>
+              <a:t> </a:t>
+            </a:r>
+            <a:r>
+              <a:rPr lang="en-GB" dirty="0">
                 <a:solidFill>
                   <a:srgbClr val="C00000"/>
                 </a:solidFill>
@@ -7033,7 +6933,7 @@
                 </a:highlight>
                 <a:latin typeface="Menlo" panose="020B0609030804020204" pitchFamily="49" charset="0"/>
               </a:rPr>
-              <a:t>Saara</a:t>
+              <a:t>Saara, Stefanie, Vladimir</a:t>
             </a:r>
             <a:endParaRPr lang="en-GB" b="0" dirty="0">
               <a:solidFill>
@@ -7062,19 +6962,38 @@
                 <a:effectLst/>
                 <a:latin typeface="Menlo" panose="020B0609030804020204" pitchFamily="49" charset="0"/>
               </a:rPr>
-              <a:t>Game Designer: game mechanics, content creation (story, tasks), and user experience. Easter eggs.</a:t>
+              <a:t>Art Designer: </a:t>
             </a:r>
             <a:r>
               <a:rPr lang="en-GB" dirty="0">
                 <a:solidFill>
-                  <a:srgbClr val="C00000"/>
-                </a:solidFill>
-                <a:latin typeface="Menlo" panose="020B0609030804020204" pitchFamily="49" charset="0"/>
-              </a:rPr>
-              <a:t> </a:t>
-            </a:r>
-            <a:r>
-              <a:rPr lang="en-GB" dirty="0" err="1">
+                  <a:srgbClr val="CCCCCC"/>
+                </a:solidFill>
+                <a:latin typeface="Menlo" panose="020B0609030804020204" pitchFamily="49" charset="0"/>
+              </a:rPr>
+              <a:t>finds and </a:t>
+            </a:r>
+            <a:r>
+              <a:rPr lang="en-GB" b="0" dirty="0">
+                <a:solidFill>
+                  <a:srgbClr val="CCCCCC"/>
+                </a:solidFill>
+                <a:effectLst/>
+                <a:latin typeface="Menlo" panose="020B0609030804020204" pitchFamily="49" charset="0"/>
+              </a:rPr>
+              <a:t>c</a:t>
+            </a:r>
+            <a:r>
+              <a:rPr lang="en-GB" dirty="0">
+                <a:solidFill>
+                  <a:srgbClr val="CCCCCC"/>
+                </a:solidFill>
+                <a:latin typeface="Menlo" panose="020B0609030804020204" pitchFamily="49" charset="0"/>
+              </a:rPr>
+              <a:t>reates images and designs to make the game look fine. </a:t>
+            </a:r>
+            <a:r>
+              <a:rPr lang="en-GB" dirty="0">
                 <a:solidFill>
                   <a:srgbClr val="C00000"/>
                 </a:solidFill>
@@ -7085,23 +7004,10 @@
               </a:rPr>
               <a:t>Saara</a:t>
             </a:r>
-            <a:r>
-              <a:rPr lang="en-GB" dirty="0">
-                <a:solidFill>
-                  <a:srgbClr val="C00000"/>
-                </a:solidFill>
-                <a:highlight>
-                  <a:srgbClr val="C0C0C0"/>
-                </a:highlight>
-                <a:latin typeface="Menlo" panose="020B0609030804020204" pitchFamily="49" charset="0"/>
-              </a:rPr>
-              <a:t>, Stefanie, Vladimir</a:t>
-            </a:r>
-            <a:endParaRPr lang="en-GB" b="0" dirty="0">
+            <a:endParaRPr lang="en-GB" dirty="0">
               <a:solidFill>
                 <a:srgbClr val="CCCCCC"/>
               </a:solidFill>
-              <a:effectLst/>
               <a:highlight>
                 <a:srgbClr val="C0C0C0"/>
               </a:highlight>
@@ -7155,7 +7061,7 @@
                 <a:effectLst/>
                 <a:latin typeface="Menlo" panose="020B0609030804020204" pitchFamily="49" charset="0"/>
               </a:rPr>
-              <a:t>Project Manager/Scrum Master: oversees project timelines and documentation. The only person who can merge.</a:t>
+              <a:t>Project Manager/First Scrum Master: oversees project timelines and documentation. The only person who can merge.</a:t>
             </a:r>
             <a:r>
               <a:rPr lang="en-GB" dirty="0">
@@ -7302,14 +7208,16 @@
           </a:xfrm>
         </p:spPr>
         <p:txBody>
-          <a:bodyPr/>
+          <a:bodyPr>
+            <a:normAutofit lnSpcReduction="10000"/>
+          </a:bodyPr>
           <a:lstStyle/>
           <a:p>
             <a:pPr marL="0" indent="0">
               <a:buNone/>
             </a:pPr>
             <a:r>
-              <a:rPr lang="en-GB" sz="2000" dirty="0" err="1">
+              <a:rPr lang="en-GB" sz="2000" dirty="0">
                 <a:solidFill>
                   <a:srgbClr val="C00000"/>
                 </a:solidFill>
@@ -7336,7 +7244,7 @@
                 </a:solidFill>
                 <a:latin typeface="Menlo" panose="020B0609030804020204" pitchFamily="49" charset="0"/>
               </a:rPr>
-              <a:t>is an interactive game where players learn history by solving puzzles from different time periods, making education engaging and fun.</a:t>
+              <a:t>is an interactive game where players learn about history by solving puzzles/minigames related to different time periods, aiming to win by getting through Earth history to the present moment.</a:t>
             </a:r>
           </a:p>
           <a:p>
@@ -7350,25 +7258,7 @@
                 </a:solidFill>
                 <a:latin typeface="Menlo" panose="020B0609030804020204" pitchFamily="49" charset="0"/>
               </a:rPr>
-              <a:t>By blending history with interactive gameplay, </a:t>
-            </a:r>
-            <a:r>
-              <a:rPr lang="en-GB" sz="2000" dirty="0" err="1">
-                <a:solidFill>
-                  <a:srgbClr val="CCCCCC"/>
-                </a:solidFill>
-                <a:latin typeface="Menlo" panose="020B0609030804020204" pitchFamily="49" charset="0"/>
-              </a:rPr>
-              <a:t>Timelink</a:t>
-            </a:r>
-            <a:r>
-              <a:rPr lang="en-GB" sz="2000" dirty="0">
-                <a:solidFill>
-                  <a:srgbClr val="CCCCCC"/>
-                </a:solidFill>
-                <a:latin typeface="Menlo" panose="020B0609030804020204" pitchFamily="49" charset="0"/>
-              </a:rPr>
-              <a:t> aims to make learning about the past more engaging and accessible, allowing players to actively participate in uncovering historical knowledge in a way that feels like an adventure </a:t>
+              <a:t>By blending history with interactive gameplay, Timelink aims to make learning about the past more engaging and accessible, allowing players to actively participate in uncovering historical knowledge in a way that feels like a fun, little adventure.</a:t>
             </a:r>
           </a:p>
           <a:p>
@@ -7540,7 +7430,7 @@
                 </a:solidFill>
                 <a:latin typeface="Menlo" panose="020B0609030804020204" pitchFamily="49" charset="0"/>
               </a:rPr>
-              <a:t> a basic 2d map where players can move tyle by tile.</a:t>
+              <a:t> a basic 2D map where players can move tile by tile.</a:t>
             </a:r>
           </a:p>
           <a:p>
@@ -7944,23 +7834,8 @@
                 </a:solidFill>
                 <a:latin typeface="Menlo" panose="020B0609030804020204" pitchFamily="49" charset="0"/>
               </a:rPr>
-              <a:t> </a:t>
-            </a:r>
-            <a:r>
-              <a:rPr lang="en-GB" sz="1700" dirty="0" err="1">
-                <a:solidFill>
-                  <a:srgbClr val="CCCCCC"/>
-                </a:solidFill>
-                <a:latin typeface="Menlo" panose="020B0609030804020204" pitchFamily="49" charset="0"/>
-              </a:rPr>
-              <a:t>MariaBD</a:t>
-            </a:r>
-            <a:endParaRPr lang="en-GB" sz="1700" dirty="0">
-              <a:solidFill>
-                <a:srgbClr val="CCCCCC"/>
-              </a:solidFill>
-              <a:latin typeface="Menlo" panose="020B0609030804020204" pitchFamily="49" charset="0"/>
-            </a:endParaRPr>
+              <a:t> MariaBD</a:t>
+            </a:r>
           </a:p>
           <a:p>
             <a:pPr marL="0" indent="0">
@@ -8230,12 +8105,44 @@
               <a:buNone/>
             </a:pPr>
             <a:r>
-              <a:rPr lang="en-GB" sz="1700" dirty="0" err="1">
+              <a:rPr lang="en-GB" sz="1700" dirty="0">
                 <a:solidFill>
                   <a:srgbClr val="C00000"/>
                 </a:solidFill>
                 <a:latin typeface="Menlo" panose="020B0609030804020204" pitchFamily="49" charset="0"/>
               </a:rPr>
+              <a:t>Phaser.io framework </a:t>
+            </a:r>
+            <a:r>
+              <a:rPr lang="en-GB" sz="1700" dirty="0">
+                <a:solidFill>
+                  <a:srgbClr val="CCCCCC"/>
+                </a:solidFill>
+                <a:latin typeface="Menlo" panose="020B0609030804020204" pitchFamily="49" charset="0"/>
+              </a:rPr>
+              <a:t>for gameplay  mechanics</a:t>
+            </a:r>
+            <a:endParaRPr lang="en-GB" sz="1700" dirty="0">
+              <a:solidFill>
+                <a:srgbClr val="C00000"/>
+              </a:solidFill>
+              <a:highlight>
+                <a:srgbClr val="C0C0C0"/>
+              </a:highlight>
+              <a:latin typeface="Menlo" panose="020B0609030804020204" pitchFamily="49" charset="0"/>
+            </a:endParaRPr>
+          </a:p>
+          <a:p>
+            <a:pPr marL="0" indent="0">
+              <a:buNone/>
+            </a:pPr>
+            <a:r>
+              <a:rPr lang="en-GB" sz="1700" dirty="0">
+                <a:solidFill>
+                  <a:srgbClr val="C00000"/>
+                </a:solidFill>
+                <a:latin typeface="Menlo" panose="020B0609030804020204" pitchFamily="49" charset="0"/>
+              </a:rPr>
               <a:t>Axios</a:t>
             </a:r>
             <a:r>
@@ -8253,7 +8160,7 @@
               <a:buNone/>
             </a:pPr>
             <a:r>
-              <a:rPr lang="en-GB" sz="1700" dirty="0" err="1">
+              <a:rPr lang="en-GB" sz="1700" dirty="0">
                 <a:solidFill>
                   <a:srgbClr val="C00000"/>
                 </a:solidFill>
@@ -8276,7 +8183,7 @@
               <a:buNone/>
             </a:pPr>
             <a:r>
-              <a:rPr lang="en-GB" sz="1700" dirty="0" err="1">
+              <a:rPr lang="en-GB" sz="1700" dirty="0">
                 <a:solidFill>
                   <a:srgbClr val="C00000"/>
                 </a:solidFill>
@@ -8325,38 +8232,6 @@
               <a:buNone/>
             </a:pPr>
             <a:r>
-              <a:rPr lang="en-GB" sz="1700" dirty="0" err="1">
-                <a:solidFill>
-                  <a:srgbClr val="C00000"/>
-                </a:solidFill>
-                <a:latin typeface="Menlo" panose="020B0609030804020204" pitchFamily="49" charset="0"/>
-              </a:rPr>
-              <a:t>Phaser.io</a:t>
-            </a:r>
-            <a:r>
-              <a:rPr lang="en-GB" sz="1700" dirty="0">
-                <a:solidFill>
-                  <a:srgbClr val="C00000"/>
-                </a:solidFill>
-                <a:latin typeface="Menlo" panose="020B0609030804020204" pitchFamily="49" charset="0"/>
-              </a:rPr>
-              <a:t> framework </a:t>
-            </a:r>
-            <a:r>
-              <a:rPr lang="en-GB" sz="1700" dirty="0">
-                <a:solidFill>
-                  <a:srgbClr val="CCCCCC"/>
-                </a:solidFill>
-                <a:latin typeface="Menlo" panose="020B0609030804020204" pitchFamily="49" charset="0"/>
-              </a:rPr>
-              <a:t>for gameplay  mechanics</a:t>
-            </a:r>
-          </a:p>
-          <a:p>
-            <a:pPr marL="0" indent="0">
-              <a:buNone/>
-            </a:pPr>
-            <a:r>
               <a:rPr lang="en-GB" sz="1700" dirty="0">
                 <a:solidFill>
                   <a:srgbClr val="C00000"/>
@@ -8389,43 +8264,7 @@
                 </a:solidFill>
                 <a:latin typeface="Menlo" panose="020B0609030804020204" pitchFamily="49" charset="0"/>
               </a:rPr>
-              <a:t> https://</a:t>
-            </a:r>
-            <a:r>
-              <a:rPr lang="en-GB" sz="1700" dirty="0" err="1">
-                <a:solidFill>
-                  <a:srgbClr val="CCCCCC"/>
-                </a:solidFill>
-                <a:latin typeface="Menlo" panose="020B0609030804020204" pitchFamily="49" charset="0"/>
-              </a:rPr>
-              <a:t>audiomack.com</a:t>
-            </a:r>
-            <a:r>
-              <a:rPr lang="en-GB" sz="1700" dirty="0">
-                <a:solidFill>
-                  <a:srgbClr val="CCCCCC"/>
-                </a:solidFill>
-                <a:latin typeface="Menlo" panose="020B0609030804020204" pitchFamily="49" charset="0"/>
-              </a:rPr>
-              <a:t>/data-</a:t>
-            </a:r>
-            <a:r>
-              <a:rPr lang="en-GB" sz="1700" dirty="0" err="1">
-                <a:solidFill>
-                  <a:srgbClr val="CCCCCC"/>
-                </a:solidFill>
-                <a:latin typeface="Menlo" panose="020B0609030804020204" pitchFamily="49" charset="0"/>
-              </a:rPr>
-              <a:t>api</a:t>
-            </a:r>
-            <a:r>
-              <a:rPr lang="en-GB" sz="1700" dirty="0">
-                <a:solidFill>
-                  <a:srgbClr val="CCCCCC"/>
-                </a:solidFill>
-                <a:latin typeface="Menlo" panose="020B0609030804020204" pitchFamily="49" charset="0"/>
-              </a:rPr>
-              <a:t>/docs</a:t>
+              <a:t> https://audiomack.com/data-api/docs</a:t>
             </a:r>
           </a:p>
           <a:p>
@@ -9044,7 +8883,7 @@
                 </a:solidFill>
                 <a:latin typeface="Menlo" panose="020B0609030804020204" pitchFamily="49" charset="0"/>
               </a:rPr>
-              <a:t>assign clear roles and deadlines. Regular meetings will help ensure everyone is on track and allow quick adjustment for any roadblocks.</a:t>
+              <a:t>assign clear roles and deadlines. Regular meetings will help ensure everyone is on track, workload is divided fairly and allow quick adjustment for any roadblocks.</a:t>
             </a:r>
           </a:p>
           <a:p>
@@ -9524,7 +9363,7 @@
                 <a:ea typeface="Menlo" panose="020B0609030804020204" pitchFamily="49" charset="0"/>
                 <a:cs typeface="Menlo" panose="020B0609030804020204" pitchFamily="49" charset="0"/>
               </a:rPr>
-              <a:t>Regular check-Ins:</a:t>
+              <a:t>Regular check-ins:</a:t>
             </a:r>
             <a:r>
               <a:rPr lang="en-GB" sz="1250" dirty="0">

</xml_diff>